<commit_message>
Add (3) Elementare Wahrscheinlichkieten
</commit_message>
<xml_diff>
--- a/Abbildungen/wtfi_3_wahrscheinlichkeitstheorie_modell.pptx
+++ b/Abbildungen/wtfi_3_wahrscheinlichkeitstheorie_modell.pptx
@@ -243,7 +243,7 @@
           <a:p>
             <a:fld id="{2B41A6A7-50F4-463B-910E-CFAB06BEAEBD}" type="datetimeFigureOut">
               <a:rPr lang="de-DE" smtClean="0"/>
-              <a:t>20.10.2021</a:t>
+              <a:t>11.10.2022</a:t>
             </a:fld>
             <a:endParaRPr lang="de-DE"/>
           </a:p>
@@ -285,7 +285,7 @@
           <a:p>
             <a:fld id="{21F71EA9-8F64-41D2-B146-948977218CCE}" type="slidenum">
               <a:rPr lang="de-DE" smtClean="0"/>
-              <a:t>‹#›</a:t>
+              <a:t>‹Nr.›</a:t>
             </a:fld>
             <a:endParaRPr lang="de-DE"/>
           </a:p>
@@ -413,7 +413,7 @@
           <a:p>
             <a:fld id="{2B41A6A7-50F4-463B-910E-CFAB06BEAEBD}" type="datetimeFigureOut">
               <a:rPr lang="de-DE" smtClean="0"/>
-              <a:t>20.10.2021</a:t>
+              <a:t>11.10.2022</a:t>
             </a:fld>
             <a:endParaRPr lang="de-DE"/>
           </a:p>
@@ -455,7 +455,7 @@
           <a:p>
             <a:fld id="{21F71EA9-8F64-41D2-B146-948977218CCE}" type="slidenum">
               <a:rPr lang="de-DE" smtClean="0"/>
-              <a:t>‹#›</a:t>
+              <a:t>‹Nr.›</a:t>
             </a:fld>
             <a:endParaRPr lang="de-DE"/>
           </a:p>
@@ -593,7 +593,7 @@
           <a:p>
             <a:fld id="{2B41A6A7-50F4-463B-910E-CFAB06BEAEBD}" type="datetimeFigureOut">
               <a:rPr lang="de-DE" smtClean="0"/>
-              <a:t>20.10.2021</a:t>
+              <a:t>11.10.2022</a:t>
             </a:fld>
             <a:endParaRPr lang="de-DE"/>
           </a:p>
@@ -635,7 +635,7 @@
           <a:p>
             <a:fld id="{21F71EA9-8F64-41D2-B146-948977218CCE}" type="slidenum">
               <a:rPr lang="de-DE" smtClean="0"/>
-              <a:t>‹#›</a:t>
+              <a:t>‹Nr.›</a:t>
             </a:fld>
             <a:endParaRPr lang="de-DE"/>
           </a:p>
@@ -763,7 +763,7 @@
           <a:p>
             <a:fld id="{2B41A6A7-50F4-463B-910E-CFAB06BEAEBD}" type="datetimeFigureOut">
               <a:rPr lang="de-DE" smtClean="0"/>
-              <a:t>20.10.2021</a:t>
+              <a:t>11.10.2022</a:t>
             </a:fld>
             <a:endParaRPr lang="de-DE"/>
           </a:p>
@@ -805,7 +805,7 @@
           <a:p>
             <a:fld id="{21F71EA9-8F64-41D2-B146-948977218CCE}" type="slidenum">
               <a:rPr lang="de-DE" smtClean="0"/>
-              <a:t>‹#›</a:t>
+              <a:t>‹Nr.›</a:t>
             </a:fld>
             <a:endParaRPr lang="de-DE"/>
           </a:p>
@@ -1009,7 +1009,7 @@
           <a:p>
             <a:fld id="{2B41A6A7-50F4-463B-910E-CFAB06BEAEBD}" type="datetimeFigureOut">
               <a:rPr lang="de-DE" smtClean="0"/>
-              <a:t>20.10.2021</a:t>
+              <a:t>11.10.2022</a:t>
             </a:fld>
             <a:endParaRPr lang="de-DE"/>
           </a:p>
@@ -1051,7 +1051,7 @@
           <a:p>
             <a:fld id="{21F71EA9-8F64-41D2-B146-948977218CCE}" type="slidenum">
               <a:rPr lang="de-DE" smtClean="0"/>
-              <a:t>‹#›</a:t>
+              <a:t>‹Nr.›</a:t>
             </a:fld>
             <a:endParaRPr lang="de-DE"/>
           </a:p>
@@ -1241,7 +1241,7 @@
           <a:p>
             <a:fld id="{2B41A6A7-50F4-463B-910E-CFAB06BEAEBD}" type="datetimeFigureOut">
               <a:rPr lang="de-DE" smtClean="0"/>
-              <a:t>20.10.2021</a:t>
+              <a:t>11.10.2022</a:t>
             </a:fld>
             <a:endParaRPr lang="de-DE"/>
           </a:p>
@@ -1283,7 +1283,7 @@
           <a:p>
             <a:fld id="{21F71EA9-8F64-41D2-B146-948977218CCE}" type="slidenum">
               <a:rPr lang="de-DE" smtClean="0"/>
-              <a:t>‹#›</a:t>
+              <a:t>‹Nr.›</a:t>
             </a:fld>
             <a:endParaRPr lang="de-DE"/>
           </a:p>
@@ -1608,7 +1608,7 @@
           <a:p>
             <a:fld id="{2B41A6A7-50F4-463B-910E-CFAB06BEAEBD}" type="datetimeFigureOut">
               <a:rPr lang="de-DE" smtClean="0"/>
-              <a:t>20.10.2021</a:t>
+              <a:t>11.10.2022</a:t>
             </a:fld>
             <a:endParaRPr lang="de-DE"/>
           </a:p>
@@ -1650,7 +1650,7 @@
           <a:p>
             <a:fld id="{21F71EA9-8F64-41D2-B146-948977218CCE}" type="slidenum">
               <a:rPr lang="de-DE" smtClean="0"/>
-              <a:t>‹#›</a:t>
+              <a:t>‹Nr.›</a:t>
             </a:fld>
             <a:endParaRPr lang="de-DE"/>
           </a:p>
@@ -1726,7 +1726,7 @@
           <a:p>
             <a:fld id="{2B41A6A7-50F4-463B-910E-CFAB06BEAEBD}" type="datetimeFigureOut">
               <a:rPr lang="de-DE" smtClean="0"/>
-              <a:t>20.10.2021</a:t>
+              <a:t>11.10.2022</a:t>
             </a:fld>
             <a:endParaRPr lang="de-DE"/>
           </a:p>
@@ -1768,7 +1768,7 @@
           <a:p>
             <a:fld id="{21F71EA9-8F64-41D2-B146-948977218CCE}" type="slidenum">
               <a:rPr lang="de-DE" smtClean="0"/>
-              <a:t>‹#›</a:t>
+              <a:t>‹Nr.›</a:t>
             </a:fld>
             <a:endParaRPr lang="de-DE"/>
           </a:p>
@@ -1821,7 +1821,7 @@
           <a:p>
             <a:fld id="{2B41A6A7-50F4-463B-910E-CFAB06BEAEBD}" type="datetimeFigureOut">
               <a:rPr lang="de-DE" smtClean="0"/>
-              <a:t>20.10.2021</a:t>
+              <a:t>11.10.2022</a:t>
             </a:fld>
             <a:endParaRPr lang="de-DE"/>
           </a:p>
@@ -1863,7 +1863,7 @@
           <a:p>
             <a:fld id="{21F71EA9-8F64-41D2-B146-948977218CCE}" type="slidenum">
               <a:rPr lang="de-DE" smtClean="0"/>
-              <a:t>‹#›</a:t>
+              <a:t>‹Nr.›</a:t>
             </a:fld>
             <a:endParaRPr lang="de-DE"/>
           </a:p>
@@ -2098,7 +2098,7 @@
           <a:p>
             <a:fld id="{2B41A6A7-50F4-463B-910E-CFAB06BEAEBD}" type="datetimeFigureOut">
               <a:rPr lang="de-DE" smtClean="0"/>
-              <a:t>20.10.2021</a:t>
+              <a:t>11.10.2022</a:t>
             </a:fld>
             <a:endParaRPr lang="de-DE"/>
           </a:p>
@@ -2140,7 +2140,7 @@
           <a:p>
             <a:fld id="{21F71EA9-8F64-41D2-B146-948977218CCE}" type="slidenum">
               <a:rPr lang="de-DE" smtClean="0"/>
-              <a:t>‹#›</a:t>
+              <a:t>‹Nr.›</a:t>
             </a:fld>
             <a:endParaRPr lang="de-DE"/>
           </a:p>
@@ -2355,7 +2355,7 @@
           <a:p>
             <a:fld id="{2B41A6A7-50F4-463B-910E-CFAB06BEAEBD}" type="datetimeFigureOut">
               <a:rPr lang="de-DE" smtClean="0"/>
-              <a:t>20.10.2021</a:t>
+              <a:t>11.10.2022</a:t>
             </a:fld>
             <a:endParaRPr lang="de-DE"/>
           </a:p>
@@ -2397,7 +2397,7 @@
           <a:p>
             <a:fld id="{21F71EA9-8F64-41D2-B146-948977218CCE}" type="slidenum">
               <a:rPr lang="de-DE" smtClean="0"/>
-              <a:t>‹#›</a:t>
+              <a:t>‹Nr.›</a:t>
             </a:fld>
             <a:endParaRPr lang="de-DE"/>
           </a:p>
@@ -2568,7 +2568,7 @@
           <a:p>
             <a:fld id="{2B41A6A7-50F4-463B-910E-CFAB06BEAEBD}" type="datetimeFigureOut">
               <a:rPr lang="de-DE" smtClean="0"/>
-              <a:t>20.10.2021</a:t>
+              <a:t>11.10.2022</a:t>
             </a:fld>
             <a:endParaRPr lang="de-DE"/>
           </a:p>
@@ -2646,7 +2646,7 @@
           <a:p>
             <a:fld id="{21F71EA9-8F64-41D2-B146-948977218CCE}" type="slidenum">
               <a:rPr lang="de-DE" smtClean="0"/>
-              <a:t>‹#›</a:t>
+              <a:t>‹Nr.›</a:t>
             </a:fld>
             <a:endParaRPr lang="de-DE"/>
           </a:p>
@@ -3460,8 +3460,8 @@
             </a:p>
           </p:txBody>
         </p:sp>
-        <mc:AlternateContent xmlns:mc="http://schemas.openxmlformats.org/markup-compatibility/2006" xmlns:a14="http://schemas.microsoft.com/office/drawing/2010/main">
-          <mc:Choice Requires="a14">
+        <mc:AlternateContent xmlns:mc="http://schemas.openxmlformats.org/markup-compatibility/2006">
+          <mc:Choice xmlns:a14="http://schemas.microsoft.com/office/drawing/2010/main" Requires="a14">
             <p:sp>
               <p:nvSpPr>
                 <p:cNvPr id="16" name="TextBox 15">
@@ -3477,7 +3477,7 @@
               <p:spPr>
                 <a:xfrm>
                   <a:off x="1398803" y="3407910"/>
-                  <a:ext cx="1905906" cy="338554"/>
+                  <a:ext cx="1875257" cy="338554"/>
                 </a:xfrm>
                 <a:prstGeom prst="rect">
                   <a:avLst/>
@@ -3500,7 +3500,7 @@
                         <m:d>
                           <m:dPr>
                             <m:ctrlPr>
-                              <a:rPr lang="de-DE" sz="1600" i="1">
+                              <a:rPr lang="de-DE" sz="1600" i="1" smtClean="0">
                                 <a:solidFill>
                                   <a:srgbClr val="0070C0"/>
                                 </a:solidFill>
@@ -3569,13 +3569,13 @@
                           <m:t>, </m:t>
                         </m:r>
                         <m:r>
-                          <a:rPr lang="de-DE" sz="1600" i="1">
+                          <a:rPr lang="de-DE" sz="1600" b="0" i="1" smtClean="0">
                             <a:solidFill>
                               <a:srgbClr val="0070C0"/>
                             </a:solidFill>
                             <a:latin typeface="Cambria Math" panose="02040503050406030204" pitchFamily="18" charset="0"/>
                           </a:rPr>
-                          <m:t>𝑋</m:t>
+                          <m:t>𝜉</m:t>
                         </m:r>
                         <m:r>
                           <a:rPr lang="de-DE" sz="1600" i="1">
@@ -3628,7 +3628,7 @@
               </p:txBody>
             </p:sp>
           </mc:Choice>
-          <mc:Fallback xmlns="">
+          <mc:Fallback>
             <p:sp>
               <p:nvSpPr>
                 <p:cNvPr id="16" name="TextBox 15">
@@ -3646,7 +3646,7 @@
               <p:spPr>
                 <a:xfrm>
                   <a:off x="1398803" y="3407910"/>
-                  <a:ext cx="1905906" cy="338554"/>
+                  <a:ext cx="1875257" cy="338554"/>
                 </a:xfrm>
                 <a:prstGeom prst="rect">
                   <a:avLst/>
@@ -3654,7 +3654,7 @@
                 <a:blipFill>
                   <a:blip r:embed="rId3"/>
                   <a:stretch>
-                    <a:fillRect/>
+                    <a:fillRect b="-10909"/>
                   </a:stretch>
                 </a:blipFill>
               </p:spPr>
@@ -3673,8 +3673,8 @@
             </p:sp>
           </mc:Fallback>
         </mc:AlternateContent>
-        <mc:AlternateContent xmlns:mc="http://schemas.openxmlformats.org/markup-compatibility/2006" xmlns:a14="http://schemas.microsoft.com/office/drawing/2010/main">
-          <mc:Choice Requires="a14">
+        <mc:AlternateContent xmlns:mc="http://schemas.openxmlformats.org/markup-compatibility/2006">
+          <mc:Choice xmlns:a14="http://schemas.microsoft.com/office/drawing/2010/main" Requires="a14">
             <p:sp>
               <p:nvSpPr>
                 <p:cNvPr id="17" name="TextBox 16">
@@ -3690,7 +3690,7 @@
               <p:spPr>
                 <a:xfrm>
                   <a:off x="1362607" y="4157997"/>
-                  <a:ext cx="1978298" cy="338554"/>
+                  <a:ext cx="1930913" cy="364780"/>
                 </a:xfrm>
                 <a:prstGeom prst="rect">
                   <a:avLst/>
@@ -3713,7 +3713,7 @@
                         <m:sSub>
                           <m:sSubPr>
                             <m:ctrlPr>
-                              <a:rPr lang="de-DE" sz="1600" i="1">
+                              <a:rPr lang="de-DE" sz="1600" i="1" smtClean="0">
                                 <a:solidFill>
                                   <a:srgbClr val="0070C0"/>
                                 </a:solidFill>
@@ -3734,13 +3734,13 @@
                           </m:e>
                           <m:sub>
                             <m:r>
-                              <a:rPr lang="de-DE" sz="1600" i="1">
+                              <a:rPr lang="de-DE" sz="1600" b="0" i="1" smtClean="0">
                                 <a:solidFill>
                                   <a:srgbClr val="0070C0"/>
                                 </a:solidFill>
                                 <a:latin typeface="Cambria Math" panose="02040503050406030204" pitchFamily="18" charset="0"/>
                               </a:rPr>
-                              <m:t>𝑋</m:t>
+                              <m:t>𝜉</m:t>
                             </m:r>
                           </m:sub>
                         </m:sSub>
@@ -3807,13 +3807,13 @@
                           </m:sSupPr>
                           <m:e>
                             <m:r>
-                              <a:rPr lang="de-DE" sz="1600" i="1">
+                              <a:rPr lang="de-DE" sz="1600" b="0" i="1" smtClean="0">
                                 <a:solidFill>
                                   <a:srgbClr val="0070C0"/>
                                 </a:solidFill>
                                 <a:latin typeface="Cambria Math" panose="02040503050406030204" pitchFamily="18" charset="0"/>
                               </a:rPr>
-                              <m:t>𝑋</m:t>
+                              <m:t>𝜉</m:t>
                             </m:r>
                           </m:e>
                           <m:sup>
@@ -3867,7 +3867,7 @@
               </p:txBody>
             </p:sp>
           </mc:Choice>
-          <mc:Fallback xmlns="">
+          <mc:Fallback>
             <p:sp>
               <p:nvSpPr>
                 <p:cNvPr id="17" name="TextBox 16">
@@ -3885,7 +3885,7 @@
               <p:spPr>
                 <a:xfrm>
                   <a:off x="1362607" y="4157997"/>
-                  <a:ext cx="1978298" cy="338554"/>
+                  <a:ext cx="1930913" cy="364780"/>
                 </a:xfrm>
                 <a:prstGeom prst="rect">
                   <a:avLst/>
@@ -3893,7 +3893,7 @@
                 <a:blipFill>
                   <a:blip r:embed="rId4"/>
                   <a:stretch>
-                    <a:fillRect b="-8929"/>
+                    <a:fillRect b="-5000"/>
                   </a:stretch>
                 </a:blipFill>
               </p:spPr>

</xml_diff>